<commit_message>
spike: spike ActionSetting.target_slide & .hyperlink
</commit_message>
<xml_diff>
--- a/features/steps/test_files/act-props.pptx
+++ b/features/steps/test_files/act-props.pptx
@@ -5,14 +5,18 @@
     <p:sldMasterId id="2147483648" r:id="rId1"/>
   </p:sldMasterIdLst>
   <p:sldIdLst>
-    <p:sldId id="256" r:id="rId2"/>
+    <p:sldId id="257" r:id="rId2"/>
+    <p:sldId id="261" r:id="rId3"/>
+    <p:sldId id="256" r:id="rId4"/>
+    <p:sldId id="259" r:id="rId5"/>
+    <p:sldId id="260" r:id="rId6"/>
   </p:sldIdLst>
   <p:sldSz cx="9144000" cy="6858000" type="screen4x3"/>
   <p:notesSz cx="6858000" cy="9144000"/>
   <p:custShowLst>
     <p:custShow name="Custom Show 1" id="0">
       <p:sldLst>
-        <p:sld r:id="rId2"/>
+        <p:sld r:id="rId4"/>
       </p:sldLst>
     </p:custShow>
   </p:custShowLst>
@@ -439,6 +443,126 @@
       </p:grpSpPr>
       <p:sp>
         <p:nvSpPr>
+          <p:cNvPr id="2" name="TextBox 1"/>
+          <p:cNvSpPr txBox="1"/>
+          <p:nvPr/>
+        </p:nvSpPr>
+        <p:spPr>
+          <a:xfrm>
+            <a:off x="4280157" y="3244334"/>
+            <a:ext cx="583686" cy="369332"/>
+          </a:xfrm>
+          <a:prstGeom prst="rect">
+            <a:avLst/>
+          </a:prstGeom>
+          <a:noFill/>
+        </p:spPr>
+        <p:txBody>
+          <a:bodyPr wrap="none" rtlCol="0" anchor="ctr" anchorCtr="1">
+            <a:spAutoFit/>
+          </a:bodyPr>
+          <a:lstStyle/>
+          <a:p>
+            <a:r>
+              <a:rPr lang="en-US" dirty="0" smtClean="0"/>
+              <a:t>First</a:t>
+            </a:r>
+            <a:endParaRPr lang="en-US" dirty="0"/>
+          </a:p>
+        </p:txBody>
+      </p:sp>
+    </p:spTree>
+    <p:extLst>
+      <p:ext uri="{BB962C8B-B14F-4D97-AF65-F5344CB8AC3E}">
+        <p14:creationId xmlns:p14="http://schemas.microsoft.com/office/powerpoint/2010/main" val="580740162"/>
+      </p:ext>
+    </p:extLst>
+  </p:cSld>
+  <p:clrMapOvr>
+    <a:masterClrMapping/>
+  </p:clrMapOvr>
+</p:sld>
+</file>
+
+<file path=ppt/slides/slide2.xml><?xml version="1.0" encoding="utf-8"?>
+<p:sld xmlns:a="http://schemas.openxmlformats.org/drawingml/2006/main" xmlns:r="http://schemas.openxmlformats.org/officeDocument/2006/relationships" xmlns:p="http://schemas.openxmlformats.org/presentationml/2006/main">
+  <p:cSld>
+    <p:spTree>
+      <p:nvGrpSpPr>
+        <p:cNvPr id="1" name=""/>
+        <p:cNvGrpSpPr/>
+        <p:nvPr/>
+      </p:nvGrpSpPr>
+      <p:grpSpPr>
+        <a:xfrm>
+          <a:off x="0" y="0"/>
+          <a:ext cx="0" cy="0"/>
+          <a:chOff x="0" y="0"/>
+          <a:chExt cx="0" cy="0"/>
+        </a:xfrm>
+      </p:grpSpPr>
+      <p:sp>
+        <p:nvSpPr>
+          <p:cNvPr id="2" name="TextBox 1"/>
+          <p:cNvSpPr txBox="1"/>
+          <p:nvPr/>
+        </p:nvSpPr>
+        <p:spPr>
+          <a:xfrm>
+            <a:off x="4079397" y="3244334"/>
+            <a:ext cx="985206" cy="369332"/>
+          </a:xfrm>
+          <a:prstGeom prst="rect">
+            <a:avLst/>
+          </a:prstGeom>
+          <a:noFill/>
+        </p:spPr>
+        <p:txBody>
+          <a:bodyPr wrap="none" rtlCol="0" anchor="ctr" anchorCtr="1">
+            <a:spAutoFit/>
+          </a:bodyPr>
+          <a:lstStyle/>
+          <a:p>
+            <a:r>
+              <a:rPr lang="en-US" dirty="0" smtClean="0"/>
+              <a:t>Previous</a:t>
+            </a:r>
+            <a:endParaRPr lang="en-US" dirty="0"/>
+          </a:p>
+        </p:txBody>
+      </p:sp>
+    </p:spTree>
+    <p:extLst>
+      <p:ext uri="{BB962C8B-B14F-4D97-AF65-F5344CB8AC3E}">
+        <p14:creationId xmlns:p14="http://schemas.microsoft.com/office/powerpoint/2010/main" val="768184383"/>
+      </p:ext>
+    </p:extLst>
+  </p:cSld>
+  <p:clrMapOvr>
+    <a:masterClrMapping/>
+  </p:clrMapOvr>
+</p:sld>
+</file>
+
+<file path=ppt/slides/slide3.xml><?xml version="1.0" encoding="utf-8"?>
+<p:sld xmlns:a="http://schemas.openxmlformats.org/drawingml/2006/main" xmlns:r="http://schemas.openxmlformats.org/officeDocument/2006/relationships" xmlns:p="http://schemas.openxmlformats.org/presentationml/2006/main">
+  <p:cSld>
+    <p:spTree>
+      <p:nvGrpSpPr>
+        <p:cNvPr id="1" name=""/>
+        <p:cNvGrpSpPr/>
+        <p:nvPr/>
+      </p:nvGrpSpPr>
+      <p:grpSpPr>
+        <a:xfrm>
+          <a:off x="0" y="0"/>
+          <a:ext cx="0" cy="0"/>
+          <a:chOff x="0" y="0"/>
+          <a:chExt cx="0" cy="0"/>
+        </a:xfrm>
+      </p:grpSpPr>
+      <p:sp>
+        <p:nvSpPr>
           <p:cNvPr id="2" name="Rounded Rectangle 1"/>
           <p:cNvSpPr/>
           <p:nvPr/>
@@ -1232,12 +1356,12 @@
           <a:graphicData uri="http://schemas.openxmlformats.org/presentationml/2006/ole">
             <mc:AlternateContent xmlns:mc="http://schemas.openxmlformats.org/markup-compatibility/2006">
               <mc:Choice xmlns:v="urn:schemas-microsoft-com:vml" Requires="v">
-                <p:oleObj spid="_x0000_s1028" name="Worksheet" r:id="rId8" imgW="619186" imgH="771660" progId="Excel.Sheet.12">
+                <p:oleObj spid="_x0000_s1030" name="Worksheet" r:id="rId7" imgW="619186" imgH="771660" progId="Excel.Sheet.12">
                   <p:embed/>
                 </p:oleObj>
               </mc:Choice>
               <mc:Fallback>
-                <p:oleObj name="Worksheet" r:id="rId8" imgW="619186" imgH="771660" progId="Excel.Sheet.12">
+                <p:oleObj name="Worksheet" r:id="rId7" imgW="619186" imgH="771660" progId="Excel.Sheet.12">
                   <p:embed/>
                   <p:pic>
                     <p:nvPicPr>
@@ -1246,7 +1370,7 @@
                       <p:nvPr/>
                     </p:nvPicPr>
                     <p:blipFill>
-                      <a:blip r:embed="rId9"/>
+                      <a:blip r:embed="rId8"/>
                       <a:stretch>
                         <a:fillRect/>
                       </a:stretch>
@@ -1335,7 +1459,7 @@
       <p:sp>
         <p:nvSpPr>
           <p:cNvPr id="19" name="Rounded Rectangle 18">
-            <a:hlinkClick r:id="rId10" action="ppaction://program"/>
+            <a:hlinkClick r:id="rId9" action="ppaction://program"/>
           </p:cNvPr>
           <p:cNvSpPr/>
           <p:nvPr/>
@@ -1410,10 +1534,130 @@
   <p:timing>
     <p:tnLst>
       <p:par>
-        <p:cTn xmlns:p14="http://schemas.microsoft.com/office/powerpoint/2010/main" id="1" dur="indefinite" restart="never" nodeType="tmRoot"/>
+        <p:cTn id="1" dur="indefinite" restart="never" nodeType="tmRoot"/>
       </p:par>
     </p:tnLst>
   </p:timing>
+</p:sld>
+</file>
+
+<file path=ppt/slides/slide4.xml><?xml version="1.0" encoding="utf-8"?>
+<p:sld xmlns:a="http://schemas.openxmlformats.org/drawingml/2006/main" xmlns:r="http://schemas.openxmlformats.org/officeDocument/2006/relationships" xmlns:p="http://schemas.openxmlformats.org/presentationml/2006/main">
+  <p:cSld>
+    <p:spTree>
+      <p:nvGrpSpPr>
+        <p:cNvPr id="1" name=""/>
+        <p:cNvGrpSpPr/>
+        <p:nvPr/>
+      </p:nvGrpSpPr>
+      <p:grpSpPr>
+        <a:xfrm>
+          <a:off x="0" y="0"/>
+          <a:ext cx="0" cy="0"/>
+          <a:chOff x="0" y="0"/>
+          <a:chExt cx="0" cy="0"/>
+        </a:xfrm>
+      </p:grpSpPr>
+      <p:sp>
+        <p:nvSpPr>
+          <p:cNvPr id="2" name="TextBox 1"/>
+          <p:cNvSpPr txBox="1"/>
+          <p:nvPr/>
+        </p:nvSpPr>
+        <p:spPr>
+          <a:xfrm>
+            <a:off x="4260633" y="3244334"/>
+            <a:ext cx="622735" cy="369332"/>
+          </a:xfrm>
+          <a:prstGeom prst="rect">
+            <a:avLst/>
+          </a:prstGeom>
+          <a:noFill/>
+        </p:spPr>
+        <p:txBody>
+          <a:bodyPr wrap="none" rtlCol="0">
+            <a:spAutoFit/>
+          </a:bodyPr>
+          <a:lstStyle/>
+          <a:p>
+            <a:r>
+              <a:rPr lang="en-US" dirty="0" smtClean="0"/>
+              <a:t>Next</a:t>
+            </a:r>
+            <a:endParaRPr lang="en-US" dirty="0"/>
+          </a:p>
+        </p:txBody>
+      </p:sp>
+    </p:spTree>
+    <p:extLst>
+      <p:ext uri="{BB962C8B-B14F-4D97-AF65-F5344CB8AC3E}">
+        <p14:creationId xmlns:p14="http://schemas.microsoft.com/office/powerpoint/2010/main" val="3181055061"/>
+      </p:ext>
+    </p:extLst>
+  </p:cSld>
+  <p:clrMapOvr>
+    <a:masterClrMapping/>
+  </p:clrMapOvr>
+</p:sld>
+</file>
+
+<file path=ppt/slides/slide5.xml><?xml version="1.0" encoding="utf-8"?>
+<p:sld xmlns:a="http://schemas.openxmlformats.org/drawingml/2006/main" xmlns:r="http://schemas.openxmlformats.org/officeDocument/2006/relationships" xmlns:p="http://schemas.openxmlformats.org/presentationml/2006/main">
+  <p:cSld>
+    <p:spTree>
+      <p:nvGrpSpPr>
+        <p:cNvPr id="1" name=""/>
+        <p:cNvGrpSpPr/>
+        <p:nvPr/>
+      </p:nvGrpSpPr>
+      <p:grpSpPr>
+        <a:xfrm>
+          <a:off x="0" y="0"/>
+          <a:ext cx="0" cy="0"/>
+          <a:chOff x="0" y="0"/>
+          <a:chExt cx="0" cy="0"/>
+        </a:xfrm>
+      </p:grpSpPr>
+      <p:sp>
+        <p:nvSpPr>
+          <p:cNvPr id="2" name="TextBox 1"/>
+          <p:cNvSpPr txBox="1"/>
+          <p:nvPr/>
+        </p:nvSpPr>
+        <p:spPr>
+          <a:xfrm>
+            <a:off x="4293398" y="3244334"/>
+            <a:ext cx="557204" cy="369332"/>
+          </a:xfrm>
+          <a:prstGeom prst="rect">
+            <a:avLst/>
+          </a:prstGeom>
+          <a:noFill/>
+        </p:spPr>
+        <p:txBody>
+          <a:bodyPr wrap="none" rtlCol="0">
+            <a:spAutoFit/>
+          </a:bodyPr>
+          <a:lstStyle/>
+          <a:p>
+            <a:r>
+              <a:rPr lang="en-US" dirty="0" smtClean="0"/>
+              <a:t>Last</a:t>
+            </a:r>
+            <a:endParaRPr lang="en-US" dirty="0"/>
+          </a:p>
+        </p:txBody>
+      </p:sp>
+    </p:spTree>
+    <p:extLst>
+      <p:ext uri="{BB962C8B-B14F-4D97-AF65-F5344CB8AC3E}">
+        <p14:creationId xmlns:p14="http://schemas.microsoft.com/office/powerpoint/2010/main" val="1306705328"/>
+      </p:ext>
+    </p:extLst>
+  </p:cSld>
+  <p:clrMapOvr>
+    <a:masterClrMapping/>
+  </p:clrMapOvr>
 </p:sld>
 </file>
 

</xml_diff>